<commit_message>
add admin index, pembelian
</commit_message>
<xml_diff>
--- a/alur marketplace detail.pptx
+++ b/alur marketplace detail.pptx
@@ -11400,7 +11400,7 @@
           <a:p>
             <a:fld id="{AB35B731-40FD-4E0D-8B5C-05D86327A9E9}" type="datetimeFigureOut">
               <a:rPr lang="en-US" smtClean="0"/>
-              <a:t>11/27/2023</a:t>
+              <a:t>12/7/2023</a:t>
             </a:fld>
             <a:endParaRPr lang="en-US"/>
           </a:p>
@@ -11814,7 +11814,7 @@
           <a:p>
             <a:fld id="{606C2B27-4D1A-48B7-8738-A49AEE8D618F}" type="datetimeFigureOut">
               <a:rPr lang="en-US" smtClean="0"/>
-              <a:t>11/27/2023</a:t>
+              <a:t>12/7/2023</a:t>
             </a:fld>
             <a:endParaRPr lang="en-US"/>
           </a:p>
@@ -12012,7 +12012,7 @@
           <a:p>
             <a:fld id="{606C2B27-4D1A-48B7-8738-A49AEE8D618F}" type="datetimeFigureOut">
               <a:rPr lang="en-US" smtClean="0"/>
-              <a:t>11/27/2023</a:t>
+              <a:t>12/7/2023</a:t>
             </a:fld>
             <a:endParaRPr lang="en-US"/>
           </a:p>
@@ -12220,7 +12220,7 @@
           <a:p>
             <a:fld id="{606C2B27-4D1A-48B7-8738-A49AEE8D618F}" type="datetimeFigureOut">
               <a:rPr lang="en-US" smtClean="0"/>
-              <a:t>11/27/2023</a:t>
+              <a:t>12/7/2023</a:t>
             </a:fld>
             <a:endParaRPr lang="en-US"/>
           </a:p>
@@ -12418,7 +12418,7 @@
           <a:p>
             <a:fld id="{606C2B27-4D1A-48B7-8738-A49AEE8D618F}" type="datetimeFigureOut">
               <a:rPr lang="en-US" smtClean="0"/>
-              <a:t>11/27/2023</a:t>
+              <a:t>12/7/2023</a:t>
             </a:fld>
             <a:endParaRPr lang="en-US"/>
           </a:p>
@@ -12693,7 +12693,7 @@
           <a:p>
             <a:fld id="{606C2B27-4D1A-48B7-8738-A49AEE8D618F}" type="datetimeFigureOut">
               <a:rPr lang="en-US" smtClean="0"/>
-              <a:t>11/27/2023</a:t>
+              <a:t>12/7/2023</a:t>
             </a:fld>
             <a:endParaRPr lang="en-US"/>
           </a:p>
@@ -12958,7 +12958,7 @@
           <a:p>
             <a:fld id="{606C2B27-4D1A-48B7-8738-A49AEE8D618F}" type="datetimeFigureOut">
               <a:rPr lang="en-US" smtClean="0"/>
-              <a:t>11/27/2023</a:t>
+              <a:t>12/7/2023</a:t>
             </a:fld>
             <a:endParaRPr lang="en-US"/>
           </a:p>
@@ -13370,7 +13370,7 @@
           <a:p>
             <a:fld id="{606C2B27-4D1A-48B7-8738-A49AEE8D618F}" type="datetimeFigureOut">
               <a:rPr lang="en-US" smtClean="0"/>
-              <a:t>11/27/2023</a:t>
+              <a:t>12/7/2023</a:t>
             </a:fld>
             <a:endParaRPr lang="en-US"/>
           </a:p>
@@ -13511,7 +13511,7 @@
           <a:p>
             <a:fld id="{606C2B27-4D1A-48B7-8738-A49AEE8D618F}" type="datetimeFigureOut">
               <a:rPr lang="en-US" smtClean="0"/>
-              <a:t>11/27/2023</a:t>
+              <a:t>12/7/2023</a:t>
             </a:fld>
             <a:endParaRPr lang="en-US"/>
           </a:p>
@@ -13624,7 +13624,7 @@
           <a:p>
             <a:fld id="{606C2B27-4D1A-48B7-8738-A49AEE8D618F}" type="datetimeFigureOut">
               <a:rPr lang="en-US" smtClean="0"/>
-              <a:t>11/27/2023</a:t>
+              <a:t>12/7/2023</a:t>
             </a:fld>
             <a:endParaRPr lang="en-US"/>
           </a:p>
@@ -13935,7 +13935,7 @@
           <a:p>
             <a:fld id="{606C2B27-4D1A-48B7-8738-A49AEE8D618F}" type="datetimeFigureOut">
               <a:rPr lang="en-US" smtClean="0"/>
-              <a:t>11/27/2023</a:t>
+              <a:t>12/7/2023</a:t>
             </a:fld>
             <a:endParaRPr lang="en-US"/>
           </a:p>
@@ -14223,7 +14223,7 @@
           <a:p>
             <a:fld id="{606C2B27-4D1A-48B7-8738-A49AEE8D618F}" type="datetimeFigureOut">
               <a:rPr lang="en-US" smtClean="0"/>
-              <a:t>11/27/2023</a:t>
+              <a:t>12/7/2023</a:t>
             </a:fld>
             <a:endParaRPr lang="en-US"/>
           </a:p>
@@ -14464,7 +14464,7 @@
           <a:p>
             <a:fld id="{606C2B27-4D1A-48B7-8738-A49AEE8D618F}" type="datetimeFigureOut">
               <a:rPr lang="en-US" smtClean="0"/>
-              <a:t>11/27/2023</a:t>
+              <a:t>12/7/2023</a:t>
             </a:fld>
             <a:endParaRPr lang="en-US"/>
           </a:p>
@@ -19593,6 +19593,111 @@
           </a:p>
         </p:txBody>
       </p:sp>
+      <p:sp>
+        <p:nvSpPr>
+          <p:cNvPr id="36" name="TextBox 35">
+            <a:extLst>
+              <a:ext uri="{FF2B5EF4-FFF2-40B4-BE49-F238E27FC236}">
+                <a16:creationId xmlns:a16="http://schemas.microsoft.com/office/drawing/2014/main" id="{C89E3011-BFC9-4AFF-99C4-7AE05ABA5DC8}"/>
+              </a:ext>
+            </a:extLst>
+          </p:cNvPr>
+          <p:cNvSpPr txBox="1"/>
+          <p:nvPr/>
+        </p:nvSpPr>
+        <p:spPr>
+          <a:xfrm>
+            <a:off x="2076036" y="2761352"/>
+            <a:ext cx="6093822" cy="369332"/>
+          </a:xfrm>
+          <a:prstGeom prst="rect">
+            <a:avLst/>
+          </a:prstGeom>
+          <a:noFill/>
+        </p:spPr>
+        <p:txBody>
+          <a:bodyPr wrap="square">
+            <a:spAutoFit/>
+          </a:bodyPr>
+          <a:lstStyle/>
+          <a:p>
+            <a:r>
+              <a:rPr lang="en-ID" dirty="0"/>
+              <a:t>1. https://doni-nugroho.github.io/govalas/index.html</a:t>
+            </a:r>
+          </a:p>
+        </p:txBody>
+      </p:sp>
+      <p:sp>
+        <p:nvSpPr>
+          <p:cNvPr id="37" name="TextBox 36">
+            <a:extLst>
+              <a:ext uri="{FF2B5EF4-FFF2-40B4-BE49-F238E27FC236}">
+                <a16:creationId xmlns:a16="http://schemas.microsoft.com/office/drawing/2014/main" id="{4822BE86-7B69-41A2-AC8E-A99B46B6C8F3}"/>
+              </a:ext>
+            </a:extLst>
+          </p:cNvPr>
+          <p:cNvSpPr txBox="1"/>
+          <p:nvPr/>
+        </p:nvSpPr>
+        <p:spPr>
+          <a:xfrm>
+            <a:off x="2072935" y="3034876"/>
+            <a:ext cx="6093822" cy="369332"/>
+          </a:xfrm>
+          <a:prstGeom prst="rect">
+            <a:avLst/>
+          </a:prstGeom>
+          <a:noFill/>
+        </p:spPr>
+        <p:txBody>
+          <a:bodyPr wrap="square">
+            <a:spAutoFit/>
+          </a:bodyPr>
+          <a:lstStyle/>
+          <a:p>
+            <a:r>
+              <a:rPr lang="en-ID" dirty="0"/>
+              <a:t>2. https://doni-nugroho.github.io/govalas/member/profil.html</a:t>
+            </a:r>
+          </a:p>
+        </p:txBody>
+      </p:sp>
+      <p:sp>
+        <p:nvSpPr>
+          <p:cNvPr id="38" name="TextBox 37">
+            <a:extLst>
+              <a:ext uri="{FF2B5EF4-FFF2-40B4-BE49-F238E27FC236}">
+                <a16:creationId xmlns:a16="http://schemas.microsoft.com/office/drawing/2014/main" id="{90697653-5D5C-4BCD-BB67-3DD32C5D1900}"/>
+              </a:ext>
+            </a:extLst>
+          </p:cNvPr>
+          <p:cNvSpPr txBox="1"/>
+          <p:nvPr/>
+        </p:nvSpPr>
+        <p:spPr>
+          <a:xfrm>
+            <a:off x="2083914" y="3298354"/>
+            <a:ext cx="6093822" cy="369332"/>
+          </a:xfrm>
+          <a:prstGeom prst="rect">
+            <a:avLst/>
+          </a:prstGeom>
+          <a:noFill/>
+        </p:spPr>
+        <p:txBody>
+          <a:bodyPr wrap="square">
+            <a:spAutoFit/>
+          </a:bodyPr>
+          <a:lstStyle/>
+          <a:p>
+            <a:r>
+              <a:rPr lang="en-ID" dirty="0"/>
+              <a:t>3. https://doni-nugroho.github.io/govalas/pricing.html</a:t>
+            </a:r>
+          </a:p>
+        </p:txBody>
+      </p:sp>
     </p:spTree>
     <p:extLst>
       <p:ext uri="{BB962C8B-B14F-4D97-AF65-F5344CB8AC3E}">
@@ -21210,6 +21315,111 @@
                 </a:solidFill>
               </a:rPr>
               <a:t>5</a:t>
+            </a:r>
+          </a:p>
+        </p:txBody>
+      </p:sp>
+      <p:sp>
+        <p:nvSpPr>
+          <p:cNvPr id="39" name="TextBox 38">
+            <a:extLst>
+              <a:ext uri="{FF2B5EF4-FFF2-40B4-BE49-F238E27FC236}">
+                <a16:creationId xmlns:a16="http://schemas.microsoft.com/office/drawing/2014/main" id="{598F83A1-9D20-4B5E-850D-2C9C9DDBD694}"/>
+              </a:ext>
+            </a:extLst>
+          </p:cNvPr>
+          <p:cNvSpPr txBox="1"/>
+          <p:nvPr/>
+        </p:nvSpPr>
+        <p:spPr>
+          <a:xfrm>
+            <a:off x="2092499" y="3872997"/>
+            <a:ext cx="6093822" cy="369332"/>
+          </a:xfrm>
+          <a:prstGeom prst="rect">
+            <a:avLst/>
+          </a:prstGeom>
+          <a:noFill/>
+        </p:spPr>
+        <p:txBody>
+          <a:bodyPr wrap="square">
+            <a:spAutoFit/>
+          </a:bodyPr>
+          <a:lstStyle/>
+          <a:p>
+            <a:r>
+              <a:rPr lang="en-ID" dirty="0"/>
+              <a:t>1. https://doni-nugroho.github.io/govalas/member/gerai.html</a:t>
+            </a:r>
+          </a:p>
+        </p:txBody>
+      </p:sp>
+      <p:sp>
+        <p:nvSpPr>
+          <p:cNvPr id="42" name="TextBox 41">
+            <a:extLst>
+              <a:ext uri="{FF2B5EF4-FFF2-40B4-BE49-F238E27FC236}">
+                <a16:creationId xmlns:a16="http://schemas.microsoft.com/office/drawing/2014/main" id="{0F43D629-D91E-4D80-B17A-C0294EE6C1E1}"/>
+              </a:ext>
+            </a:extLst>
+          </p:cNvPr>
+          <p:cNvSpPr txBox="1"/>
+          <p:nvPr/>
+        </p:nvSpPr>
+        <p:spPr>
+          <a:xfrm>
+            <a:off x="2089754" y="4259691"/>
+            <a:ext cx="6093822" cy="369332"/>
+          </a:xfrm>
+          <a:prstGeom prst="rect">
+            <a:avLst/>
+          </a:prstGeom>
+          <a:noFill/>
+        </p:spPr>
+        <p:txBody>
+          <a:bodyPr wrap="square">
+            <a:spAutoFit/>
+          </a:bodyPr>
+          <a:lstStyle/>
+          <a:p>
+            <a:r>
+              <a:rPr lang="en-ID" dirty="0"/>
+              <a:t>2,3,4 . https://doni-nugroho.github.io/govalas/ask-bid.html</a:t>
+            </a:r>
+          </a:p>
+        </p:txBody>
+      </p:sp>
+      <p:sp>
+        <p:nvSpPr>
+          <p:cNvPr id="43" name="TextBox 42">
+            <a:extLst>
+              <a:ext uri="{FF2B5EF4-FFF2-40B4-BE49-F238E27FC236}">
+                <a16:creationId xmlns:a16="http://schemas.microsoft.com/office/drawing/2014/main" id="{6A7ECB81-7D8F-4836-873E-0701E2601EE4}"/>
+              </a:ext>
+            </a:extLst>
+          </p:cNvPr>
+          <p:cNvSpPr txBox="1"/>
+          <p:nvPr/>
+        </p:nvSpPr>
+        <p:spPr>
+          <a:xfrm>
+            <a:off x="2091713" y="4573597"/>
+            <a:ext cx="6093822" cy="923330"/>
+          </a:xfrm>
+          <a:prstGeom prst="rect">
+            <a:avLst/>
+          </a:prstGeom>
+          <a:noFill/>
+        </p:spPr>
+        <p:txBody>
+          <a:bodyPr wrap="square">
+            <a:spAutoFit/>
+          </a:bodyPr>
+          <a:lstStyle/>
+          <a:p>
+            <a:r>
+              <a:rPr lang="en-ID" dirty="0"/>
+              <a:t>5. https://doni-nugroho.github.io/govalas/member/transaksi.html?act=req-transaksi&amp;status=1</a:t>
             </a:r>
           </a:p>
         </p:txBody>
@@ -22960,6 +23170,111 @@
                 </a:solidFill>
               </a:rPr>
               <a:t>4</a:t>
+            </a:r>
+          </a:p>
+        </p:txBody>
+      </p:sp>
+      <p:sp>
+        <p:nvSpPr>
+          <p:cNvPr id="29" name="TextBox 28">
+            <a:extLst>
+              <a:ext uri="{FF2B5EF4-FFF2-40B4-BE49-F238E27FC236}">
+                <a16:creationId xmlns:a16="http://schemas.microsoft.com/office/drawing/2014/main" id="{9ACD1AF7-80FD-43A9-9A73-75CAFD00C0D9}"/>
+              </a:ext>
+            </a:extLst>
+          </p:cNvPr>
+          <p:cNvSpPr txBox="1"/>
+          <p:nvPr/>
+        </p:nvSpPr>
+        <p:spPr>
+          <a:xfrm>
+            <a:off x="2078239" y="2813215"/>
+            <a:ext cx="6093822" cy="369332"/>
+          </a:xfrm>
+          <a:prstGeom prst="rect">
+            <a:avLst/>
+          </a:prstGeom>
+          <a:noFill/>
+        </p:spPr>
+        <p:txBody>
+          <a:bodyPr wrap="square">
+            <a:spAutoFit/>
+          </a:bodyPr>
+          <a:lstStyle/>
+          <a:p>
+            <a:r>
+              <a:rPr lang="en-ID" dirty="0"/>
+              <a:t>2. https://invoice-staging.xendit.co/od/demo-top-up</a:t>
+            </a:r>
+          </a:p>
+        </p:txBody>
+      </p:sp>
+      <p:sp>
+        <p:nvSpPr>
+          <p:cNvPr id="30" name="TextBox 29">
+            <a:extLst>
+              <a:ext uri="{FF2B5EF4-FFF2-40B4-BE49-F238E27FC236}">
+                <a16:creationId xmlns:a16="http://schemas.microsoft.com/office/drawing/2014/main" id="{D2A21227-D8FB-4B04-AC2D-A7E4F675EACF}"/>
+              </a:ext>
+            </a:extLst>
+          </p:cNvPr>
+          <p:cNvSpPr txBox="1"/>
+          <p:nvPr/>
+        </p:nvSpPr>
+        <p:spPr>
+          <a:xfrm>
+            <a:off x="2086790" y="2536275"/>
+            <a:ext cx="6093822" cy="369332"/>
+          </a:xfrm>
+          <a:prstGeom prst="rect">
+            <a:avLst/>
+          </a:prstGeom>
+          <a:noFill/>
+        </p:spPr>
+        <p:txBody>
+          <a:bodyPr wrap="square">
+            <a:spAutoFit/>
+          </a:bodyPr>
+          <a:lstStyle/>
+          <a:p>
+            <a:r>
+              <a:rPr lang="en-ID" dirty="0"/>
+              <a:t>1. https://doni-nugroho.github.io/govalas/pricing.html</a:t>
+            </a:r>
+          </a:p>
+        </p:txBody>
+      </p:sp>
+      <p:sp>
+        <p:nvSpPr>
+          <p:cNvPr id="33" name="TextBox 32">
+            <a:extLst>
+              <a:ext uri="{FF2B5EF4-FFF2-40B4-BE49-F238E27FC236}">
+                <a16:creationId xmlns:a16="http://schemas.microsoft.com/office/drawing/2014/main" id="{324F8E19-0F1F-44B7-9E76-50A74B60F419}"/>
+              </a:ext>
+            </a:extLst>
+          </p:cNvPr>
+          <p:cNvSpPr txBox="1"/>
+          <p:nvPr/>
+        </p:nvSpPr>
+        <p:spPr>
+          <a:xfrm>
+            <a:off x="2102108" y="3176919"/>
+            <a:ext cx="6093822" cy="923330"/>
+          </a:xfrm>
+          <a:prstGeom prst="rect">
+            <a:avLst/>
+          </a:prstGeom>
+          <a:noFill/>
+        </p:spPr>
+        <p:txBody>
+          <a:bodyPr wrap="square">
+            <a:spAutoFit/>
+          </a:bodyPr>
+          <a:lstStyle/>
+          <a:p>
+            <a:r>
+              <a:rPr lang="en-ID" dirty="0"/>
+              <a:t>3,4. https://doni-nugroho.github.io/govalas/member/transaksi.html?act=top-up&amp;status=1</a:t>
             </a:r>
           </a:p>
         </p:txBody>

</xml_diff>